<commit_message>
Antes de subrlo a git
</commit_message>
<xml_diff>
--- a/img/fotos_cotas.pptx
+++ b/img/fotos_cotas.pptx
@@ -259,7 +259,7 @@
           <a:p>
             <a:fld id="{C21BE1F9-2E91-4E4C-8E33-8C5F38B161C2}" type="datetimeFigureOut">
               <a:rPr lang="es-ES" smtClean="0"/>
-              <a:t>08/09/2022</a:t>
+              <a:t>09/09/2022</a:t>
             </a:fld>
             <a:endParaRPr lang="es-ES"/>
           </a:p>
@@ -429,7 +429,7 @@
           <a:p>
             <a:fld id="{C21BE1F9-2E91-4E4C-8E33-8C5F38B161C2}" type="datetimeFigureOut">
               <a:rPr lang="es-ES" smtClean="0"/>
-              <a:t>08/09/2022</a:t>
+              <a:t>09/09/2022</a:t>
             </a:fld>
             <a:endParaRPr lang="es-ES"/>
           </a:p>
@@ -609,7 +609,7 @@
           <a:p>
             <a:fld id="{C21BE1F9-2E91-4E4C-8E33-8C5F38B161C2}" type="datetimeFigureOut">
               <a:rPr lang="es-ES" smtClean="0"/>
-              <a:t>08/09/2022</a:t>
+              <a:t>09/09/2022</a:t>
             </a:fld>
             <a:endParaRPr lang="es-ES"/>
           </a:p>
@@ -779,7 +779,7 @@
           <a:p>
             <a:fld id="{C21BE1F9-2E91-4E4C-8E33-8C5F38B161C2}" type="datetimeFigureOut">
               <a:rPr lang="es-ES" smtClean="0"/>
-              <a:t>08/09/2022</a:t>
+              <a:t>09/09/2022</a:t>
             </a:fld>
             <a:endParaRPr lang="es-ES"/>
           </a:p>
@@ -1023,7 +1023,7 @@
           <a:p>
             <a:fld id="{C21BE1F9-2E91-4E4C-8E33-8C5F38B161C2}" type="datetimeFigureOut">
               <a:rPr lang="es-ES" smtClean="0"/>
-              <a:t>08/09/2022</a:t>
+              <a:t>09/09/2022</a:t>
             </a:fld>
             <a:endParaRPr lang="es-ES"/>
           </a:p>
@@ -1255,7 +1255,7 @@
           <a:p>
             <a:fld id="{C21BE1F9-2E91-4E4C-8E33-8C5F38B161C2}" type="datetimeFigureOut">
               <a:rPr lang="es-ES" smtClean="0"/>
-              <a:t>08/09/2022</a:t>
+              <a:t>09/09/2022</a:t>
             </a:fld>
             <a:endParaRPr lang="es-ES"/>
           </a:p>
@@ -1622,7 +1622,7 @@
           <a:p>
             <a:fld id="{C21BE1F9-2E91-4E4C-8E33-8C5F38B161C2}" type="datetimeFigureOut">
               <a:rPr lang="es-ES" smtClean="0"/>
-              <a:t>08/09/2022</a:t>
+              <a:t>09/09/2022</a:t>
             </a:fld>
             <a:endParaRPr lang="es-ES"/>
           </a:p>
@@ -1740,7 +1740,7 @@
           <a:p>
             <a:fld id="{C21BE1F9-2E91-4E4C-8E33-8C5F38B161C2}" type="datetimeFigureOut">
               <a:rPr lang="es-ES" smtClean="0"/>
-              <a:t>08/09/2022</a:t>
+              <a:t>09/09/2022</a:t>
             </a:fld>
             <a:endParaRPr lang="es-ES"/>
           </a:p>
@@ -1835,7 +1835,7 @@
           <a:p>
             <a:fld id="{C21BE1F9-2E91-4E4C-8E33-8C5F38B161C2}" type="datetimeFigureOut">
               <a:rPr lang="es-ES" smtClean="0"/>
-              <a:t>08/09/2022</a:t>
+              <a:t>09/09/2022</a:t>
             </a:fld>
             <a:endParaRPr lang="es-ES"/>
           </a:p>
@@ -2112,7 +2112,7 @@
           <a:p>
             <a:fld id="{C21BE1F9-2E91-4E4C-8E33-8C5F38B161C2}" type="datetimeFigureOut">
               <a:rPr lang="es-ES" smtClean="0"/>
-              <a:t>08/09/2022</a:t>
+              <a:t>09/09/2022</a:t>
             </a:fld>
             <a:endParaRPr lang="es-ES"/>
           </a:p>
@@ -2369,7 +2369,7 @@
           <a:p>
             <a:fld id="{C21BE1F9-2E91-4E4C-8E33-8C5F38B161C2}" type="datetimeFigureOut">
               <a:rPr lang="es-ES" smtClean="0"/>
-              <a:t>08/09/2022</a:t>
+              <a:t>09/09/2022</a:t>
             </a:fld>
             <a:endParaRPr lang="es-ES"/>
           </a:p>
@@ -2582,7 +2582,7 @@
           <a:p>
             <a:fld id="{C21BE1F9-2E91-4E4C-8E33-8C5F38B161C2}" type="datetimeFigureOut">
               <a:rPr lang="es-ES" smtClean="0"/>
-              <a:t>08/09/2022</a:t>
+              <a:t>09/09/2022</a:t>
             </a:fld>
             <a:endParaRPr lang="es-ES"/>
           </a:p>
@@ -3039,8 +3039,8 @@
         </p:nvCxnSpPr>
         <p:spPr>
           <a:xfrm>
-            <a:off x="1345721" y="5449496"/>
-            <a:ext cx="4295954" cy="0"/>
+            <a:off x="1258957" y="5449496"/>
+            <a:ext cx="4505739" cy="0"/>
           </a:xfrm>
           <a:prstGeom prst="straightConnector1">
             <a:avLst/>
@@ -3483,8 +3483,8 @@
         </p:nvCxnSpPr>
         <p:spPr>
           <a:xfrm flipH="1">
-            <a:off x="1841500" y="5403251"/>
-            <a:ext cx="3327400" cy="0"/>
+            <a:off x="1393371" y="5403251"/>
+            <a:ext cx="4194629" cy="0"/>
           </a:xfrm>
           <a:prstGeom prst="straightConnector1">
             <a:avLst/>
@@ -4133,12 +4133,48 @@
           <a:chExt cx="0" cy="0"/>
         </a:xfrm>
       </p:grpSpPr>
+      <p:sp>
+        <p:nvSpPr>
+          <p:cNvPr id="2" name="CuadroTexto 1">
+            <a:extLst>
+              <a:ext uri="{FF2B5EF4-FFF2-40B4-BE49-F238E27FC236}">
+                <a16:creationId xmlns:a16="http://schemas.microsoft.com/office/drawing/2014/main" id="{C1C3E135-E124-34B5-4654-F4F51811D279}"/>
+              </a:ext>
+            </a:extLst>
+          </p:cNvPr>
+          <p:cNvSpPr txBox="1"/>
+          <p:nvPr/>
+        </p:nvSpPr>
+        <p:spPr>
+          <a:xfrm>
+            <a:off x="2398163" y="6325384"/>
+            <a:ext cx="2044211" cy="477054"/>
+          </a:xfrm>
+          <a:prstGeom prst="rect">
+            <a:avLst/>
+          </a:prstGeom>
+          <a:noFill/>
+        </p:spPr>
+        <p:txBody>
+          <a:bodyPr wrap="square" rtlCol="0" anchor="ctr">
+            <a:spAutoFit/>
+          </a:bodyPr>
+          <a:lstStyle/>
+          <a:p>
+            <a:pPr algn="ctr"/>
+            <a:r>
+              <a:rPr lang="es-ES" sz="2500" b="1" dirty="0"/>
+              <a:t>Vista Superior</a:t>
+            </a:r>
+          </a:p>
+        </p:txBody>
+      </p:sp>
       <p:pic>
         <p:nvPicPr>
-          <p:cNvPr id="4" name="perno_1" descr="Imagen que contiene Icono&#10;&#10;Descripción generada automáticamente">
+          <p:cNvPr id="3" name="perno_1" descr="Imagen que contiene Icono&#10;&#10;Descripción generada automáticamente">
             <a:extLst>
               <a:ext uri="{FF2B5EF4-FFF2-40B4-BE49-F238E27FC236}">
-                <a16:creationId xmlns:a16="http://schemas.microsoft.com/office/drawing/2014/main" id="{8BD18356-4AF1-8075-642C-3EE2DA9B67F5}"/>
+                <a16:creationId xmlns:a16="http://schemas.microsoft.com/office/drawing/2014/main" id="{B86ACD2F-91DB-8556-645E-D7181B635DBF}"/>
               </a:ext>
             </a:extLst>
           </p:cNvPr>
@@ -4161,50 +4197,14 @@
         </p:blipFill>
         <p:spPr>
           <a:xfrm>
-            <a:off x="0" y="2771"/>
-            <a:ext cx="6840538" cy="6834995"/>
+            <a:off x="-1550205" y="-1571104"/>
+            <a:ext cx="10001251" cy="9993147"/>
           </a:xfrm>
           <a:prstGeom prst="rect">
             <a:avLst/>
           </a:prstGeom>
         </p:spPr>
       </p:pic>
-      <p:sp>
-        <p:nvSpPr>
-          <p:cNvPr id="2" name="CuadroTexto 1">
-            <a:extLst>
-              <a:ext uri="{FF2B5EF4-FFF2-40B4-BE49-F238E27FC236}">
-                <a16:creationId xmlns:a16="http://schemas.microsoft.com/office/drawing/2014/main" id="{C1C3E135-E124-34B5-4654-F4F51811D279}"/>
-              </a:ext>
-            </a:extLst>
-          </p:cNvPr>
-          <p:cNvSpPr txBox="1"/>
-          <p:nvPr/>
-        </p:nvSpPr>
-        <p:spPr>
-          <a:xfrm>
-            <a:off x="2398163" y="6325384"/>
-            <a:ext cx="2044211" cy="477054"/>
-          </a:xfrm>
-          <a:prstGeom prst="rect">
-            <a:avLst/>
-          </a:prstGeom>
-          <a:noFill/>
-        </p:spPr>
-        <p:txBody>
-          <a:bodyPr wrap="square" rtlCol="0" anchor="ctr">
-            <a:spAutoFit/>
-          </a:bodyPr>
-          <a:lstStyle/>
-          <a:p>
-            <a:pPr algn="ctr"/>
-            <a:r>
-              <a:rPr lang="es-ES" sz="2500" b="1" dirty="0"/>
-              <a:t>Vista Superior</a:t>
-            </a:r>
-          </a:p>
-        </p:txBody>
-      </p:sp>
     </p:spTree>
     <p:extLst>
       <p:ext uri="{BB962C8B-B14F-4D97-AF65-F5344CB8AC3E}">

</xml_diff>